<commit_message>
Amending the presentation file
</commit_message>
<xml_diff>
--- a/Proposal Presentation/Life Expectancy presentation.pptx
+++ b/Proposal Presentation/Life Expectancy presentation.pptx
@@ -9,7 +9,8 @@
     <p:sldId id="257" r:id="rId3"/>
     <p:sldId id="258" r:id="rId4"/>
     <p:sldId id="260" r:id="rId5"/>
-    <p:sldId id="259" r:id="rId6"/>
+    <p:sldId id="261" r:id="rId6"/>
+    <p:sldId id="259" r:id="rId7"/>
   </p:sldIdLst>
   <p:sldSz cx="12192000" cy="6858000"/>
   <p:notesSz cx="6858000" cy="9144000"/>
@@ -108,6 +109,11 @@
       </a:defRPr>
     </a:lvl9pPr>
   </p:defaultTextStyle>
+  <p:extLst>
+    <p:ext uri="{EFAFB233-063F-42B5-8137-9DF3F51BA10A}">
+      <p15:sldGuideLst xmlns:p15="http://schemas.microsoft.com/office/powerpoint/2012/main"/>
+    </p:ext>
+  </p:extLst>
 </p:presentation>
 </file>
 
@@ -5006,19 +5012,24 @@
           <a:p>
             <a:r>
               <a:rPr lang="en-US" sz="1800" dirty="0"/>
-              <a:t>Our class activities for flask app, jsonify and drop-down menu plots.</a:t>
+              <a:t>Our class activities for flask app, jsonify and drop-down menu plots and Heroku app.</a:t>
             </a:r>
           </a:p>
           <a:p>
             <a:r>
               <a:rPr lang="en-US" sz="1800" dirty="0"/>
-              <a:t>Tutors, TA’s, BCS Assistant, friends in the group</a:t>
-            </a:r>
+              <a:t>Tutors, TA’s, BCS Assistant, friends in </a:t>
+            </a:r>
+            <a:r>
+              <a:rPr lang="en-US" sz="1800"/>
+              <a:t>the group.</a:t>
+            </a:r>
+            <a:endParaRPr lang="en-US" sz="1800" dirty="0"/>
           </a:p>
           <a:p>
             <a:r>
               <a:rPr lang="en-US" sz="1800" dirty="0"/>
-              <a:t>And finally, of course - stack overflow again and again</a:t>
+              <a:t>And finally, of course - stack overflow again and again.</a:t>
             </a:r>
           </a:p>
         </p:txBody>
@@ -5062,6 +5073,284 @@
           <a:chExt cx="0" cy="0"/>
         </a:xfrm>
       </p:grpSpPr>
+      <p:sp useBgFill="1">
+        <p:nvSpPr>
+          <p:cNvPr id="8" name="Rectangle 7">
+            <a:extLst>
+              <a:ext uri="{FF2B5EF4-FFF2-40B4-BE49-F238E27FC236}">
+                <a16:creationId xmlns:a16="http://schemas.microsoft.com/office/drawing/2014/main" id="{8651CFA9-6065-4243-AC48-858E359780B1}"/>
+              </a:ext>
+              <a:ext uri="{C183D7F6-B498-43B3-948B-1728B52AA6E4}">
+                <adec:decorative xmlns:adec="http://schemas.microsoft.com/office/drawing/2017/decorative" val="1"/>
+              </a:ext>
+            </a:extLst>
+          </p:cNvPr>
+          <p:cNvSpPr>
+            <a:spLocks noGrp="1" noRot="1" noChangeAspect="1" noMove="1" noResize="1" noEditPoints="1" noAdjustHandles="1" noChangeArrowheads="1" noChangeShapeType="1" noTextEdit="1"/>
+          </p:cNvSpPr>
+          <p:nvPr>
+            <p:extLst>
+              <p:ext uri="{386F3935-93C4-4BCD-93E2-E3B085C9AB24}">
+                <p16:designElem xmlns:p16="http://schemas.microsoft.com/office/powerpoint/2015/main" val="1"/>
+              </p:ext>
+            </p:extLst>
+          </p:nvPr>
+        </p:nvSpPr>
+        <p:spPr>
+          <a:xfrm>
+            <a:off x="0" y="0"/>
+            <a:ext cx="12192000" cy="6858000"/>
+          </a:xfrm>
+          <a:prstGeom prst="rect">
+            <a:avLst/>
+          </a:prstGeom>
+          <a:ln>
+            <a:noFill/>
+          </a:ln>
+        </p:spPr>
+        <p:style>
+          <a:lnRef idx="2">
+            <a:schemeClr val="accent1">
+              <a:shade val="50000"/>
+            </a:schemeClr>
+          </a:lnRef>
+          <a:fillRef idx="1">
+            <a:schemeClr val="accent1"/>
+          </a:fillRef>
+          <a:effectRef idx="0">
+            <a:schemeClr val="accent1"/>
+          </a:effectRef>
+          <a:fontRef idx="minor">
+            <a:schemeClr val="lt1"/>
+          </a:fontRef>
+        </p:style>
+        <p:txBody>
+          <a:bodyPr rtlCol="0" anchor="ctr"/>
+          <a:lstStyle/>
+          <a:p>
+            <a:pPr algn="ctr"/>
+            <a:endParaRPr lang="en-US">
+              <a:solidFill>
+                <a:schemeClr val="tx1">
+                  <a:lumMod val="65000"/>
+                  <a:lumOff val="35000"/>
+                </a:schemeClr>
+              </a:solidFill>
+              <a:latin typeface="AvenirNext LT Pro Medium" panose="020B0504020202020204" pitchFamily="34" charset="0"/>
+            </a:endParaRPr>
+          </a:p>
+        </p:txBody>
+      </p:sp>
+      <p:sp>
+        <p:nvSpPr>
+          <p:cNvPr id="10" name="Rectangle 9">
+            <a:extLst>
+              <a:ext uri="{FF2B5EF4-FFF2-40B4-BE49-F238E27FC236}">
+                <a16:creationId xmlns:a16="http://schemas.microsoft.com/office/drawing/2014/main" id="{37962AE0-6A1C-4B76-9D52-10E5E6D7D3BB}"/>
+              </a:ext>
+              <a:ext uri="{C183D7F6-B498-43B3-948B-1728B52AA6E4}">
+                <adec:decorative xmlns:adec="http://schemas.microsoft.com/office/drawing/2017/decorative" val="1"/>
+              </a:ext>
+            </a:extLst>
+          </p:cNvPr>
+          <p:cNvSpPr>
+            <a:spLocks noGrp="1" noRot="1" noChangeAspect="1" noMove="1" noResize="1" noEditPoints="1" noAdjustHandles="1" noChangeArrowheads="1" noChangeShapeType="1" noTextEdit="1"/>
+          </p:cNvSpPr>
+          <p:nvPr>
+            <p:extLst>
+              <p:ext uri="{386F3935-93C4-4BCD-93E2-E3B085C9AB24}">
+                <p16:designElem xmlns:p16="http://schemas.microsoft.com/office/powerpoint/2015/main" val="1"/>
+              </p:ext>
+            </p:extLst>
+          </p:nvPr>
+        </p:nvSpPr>
+        <p:spPr>
+          <a:xfrm>
+            <a:off x="0" y="0"/>
+            <a:ext cx="6095999" cy="6858000"/>
+          </a:xfrm>
+          <a:prstGeom prst="rect">
+            <a:avLst/>
+          </a:prstGeom>
+          <a:solidFill>
+            <a:schemeClr val="bg2">
+              <a:lumMod val="90000"/>
+              <a:alpha val="70000"/>
+            </a:schemeClr>
+          </a:solidFill>
+          <a:ln>
+            <a:noFill/>
+          </a:ln>
+        </p:spPr>
+        <p:style>
+          <a:lnRef idx="2">
+            <a:schemeClr val="accent1">
+              <a:shade val="50000"/>
+            </a:schemeClr>
+          </a:lnRef>
+          <a:fillRef idx="1">
+            <a:schemeClr val="accent1"/>
+          </a:fillRef>
+          <a:effectRef idx="0">
+            <a:schemeClr val="accent1"/>
+          </a:effectRef>
+          <a:fontRef idx="minor">
+            <a:schemeClr val="lt1"/>
+          </a:fontRef>
+        </p:style>
+        <p:txBody>
+          <a:bodyPr rtlCol="0" anchor="ctr"/>
+          <a:lstStyle/>
+          <a:p>
+            <a:pPr algn="ctr"/>
+            <a:endParaRPr lang="en-US">
+              <a:solidFill>
+                <a:schemeClr val="tx1">
+                  <a:lumMod val="65000"/>
+                  <a:lumOff val="35000"/>
+                </a:schemeClr>
+              </a:solidFill>
+              <a:latin typeface="AvenirNext LT Pro Medium" panose="020B0504020202020204" pitchFamily="34" charset="0"/>
+            </a:endParaRPr>
+          </a:p>
+        </p:txBody>
+      </p:sp>
+      <p:grpSp>
+        <p:nvGrpSpPr>
+          <p:cNvPr id="12" name="Group 11">
+            <a:extLst>
+              <a:ext uri="{FF2B5EF4-FFF2-40B4-BE49-F238E27FC236}">
+                <a16:creationId xmlns:a16="http://schemas.microsoft.com/office/drawing/2014/main" id="{60D82D56-D377-48D4-8DE9-6A0A8DB5E31D}"/>
+              </a:ext>
+              <a:ext uri="{C183D7F6-B498-43B3-948B-1728B52AA6E4}">
+                <adec:decorative xmlns:adec="http://schemas.microsoft.com/office/drawing/2017/decorative" val="1"/>
+              </a:ext>
+            </a:extLst>
+          </p:cNvPr>
+          <p:cNvGrpSpPr>
+            <a:grpSpLocks noGrp="1" noUngrp="1" noRot="1" noChangeAspect="1" noMove="1" noResize="1"/>
+          </p:cNvGrpSpPr>
+          <p:nvPr>
+            <p:extLst>
+              <p:ext uri="{386F3935-93C4-4BCD-93E2-E3B085C9AB24}">
+                <p16:designElem xmlns:p16="http://schemas.microsoft.com/office/powerpoint/2015/main" val="1"/>
+              </p:ext>
+            </p:extLst>
+          </p:nvPr>
+        </p:nvGrpSpPr>
+        <p:grpSpPr>
+          <a:xfrm rot="10800000">
+            <a:off x="1" y="-2"/>
+            <a:ext cx="2696853" cy="4598233"/>
+            <a:chOff x="8059620" y="41922"/>
+            <a:chExt cx="3997615" cy="6816077"/>
+          </a:xfrm>
+        </p:grpSpPr>
+        <p:pic>
+          <p:nvPicPr>
+            <p:cNvPr id="13" name="Picture 12">
+              <a:extLst>
+                <a:ext uri="{FF2B5EF4-FFF2-40B4-BE49-F238E27FC236}">
+                  <a16:creationId xmlns:a16="http://schemas.microsoft.com/office/drawing/2014/main" id="{6D8CD235-5DAC-4779-B652-AEF90B9844AF}"/>
+                </a:ext>
+                <a:ext uri="{C183D7F6-B498-43B3-948B-1728B52AA6E4}">
+                  <adec:decorative xmlns:adec="http://schemas.microsoft.com/office/drawing/2017/decorative" val="1"/>
+                </a:ext>
+              </a:extLst>
+            </p:cNvPr>
+            <p:cNvPicPr>
+              <a:picLocks noChangeAspect="1"/>
+            </p:cNvPicPr>
+            <p:nvPr>
+              <p:extLst>
+                <p:ext uri="{386F3935-93C4-4BCD-93E2-E3B085C9AB24}">
+                  <p16:designElem xmlns:p16="http://schemas.microsoft.com/office/powerpoint/2015/main" val="1"/>
+                </p:ext>
+              </p:extLst>
+            </p:nvPr>
+          </p:nvPicPr>
+          <p:blipFill rotWithShape="1">
+            <a:blip r:embed="rId3">
+              <a:duotone>
+                <a:schemeClr val="accent6">
+                  <a:shade val="45000"/>
+                  <a:satMod val="135000"/>
+                </a:schemeClr>
+                <a:prstClr val="white"/>
+              </a:duotone>
+              <a:alphaModFix amt="7000"/>
+              <a:extLst>
+                <a:ext uri="{28A0092B-C50C-407E-A947-70E740481C1C}">
+                  <a14:useLocalDpi xmlns:a14="http://schemas.microsoft.com/office/drawing/2010/main" val="0"/>
+                </a:ext>
+              </a:extLst>
+            </a:blip>
+            <a:srcRect l="22818" b="17291"/>
+            <a:stretch/>
+          </p:blipFill>
+          <p:spPr>
+            <a:xfrm flipH="1">
+              <a:off x="8059620" y="1345934"/>
+              <a:ext cx="3997615" cy="5512065"/>
+            </a:xfrm>
+            <a:prstGeom prst="rect">
+              <a:avLst/>
+            </a:prstGeom>
+          </p:spPr>
+        </p:pic>
+        <p:pic>
+          <p:nvPicPr>
+            <p:cNvPr id="14" name="Picture 13">
+              <a:extLst>
+                <a:ext uri="{FF2B5EF4-FFF2-40B4-BE49-F238E27FC236}">
+                  <a16:creationId xmlns:a16="http://schemas.microsoft.com/office/drawing/2014/main" id="{9048802B-B281-498F-88C5-E240B74438CE}"/>
+                </a:ext>
+                <a:ext uri="{C183D7F6-B498-43B3-948B-1728B52AA6E4}">
+                  <adec:decorative xmlns:adec="http://schemas.microsoft.com/office/drawing/2017/decorative" val="1"/>
+                </a:ext>
+              </a:extLst>
+            </p:cNvPr>
+            <p:cNvPicPr>
+              <a:picLocks noChangeAspect="1"/>
+            </p:cNvPicPr>
+            <p:nvPr>
+              <p:extLst>
+                <p:ext uri="{386F3935-93C4-4BCD-93E2-E3B085C9AB24}">
+                  <p16:designElem xmlns:p16="http://schemas.microsoft.com/office/powerpoint/2015/main" val="1"/>
+                </p:ext>
+              </p:extLst>
+            </p:nvPr>
+          </p:nvPicPr>
+          <p:blipFill rotWithShape="1">
+            <a:blip r:embed="rId3">
+              <a:duotone>
+                <a:schemeClr val="accent6">
+                  <a:shade val="45000"/>
+                  <a:satMod val="135000"/>
+                </a:schemeClr>
+                <a:prstClr val="white"/>
+              </a:duotone>
+              <a:alphaModFix amt="15000"/>
+              <a:extLst>
+                <a:ext uri="{28A0092B-C50C-407E-A947-70E740481C1C}">
+                  <a14:useLocalDpi xmlns:a14="http://schemas.microsoft.com/office/drawing/2010/main" val="0"/>
+                </a:ext>
+              </a:extLst>
+            </a:blip>
+            <a:srcRect r="40690"/>
+            <a:stretch/>
+          </p:blipFill>
+          <p:spPr>
+            <a:xfrm>
+              <a:off x="8915400" y="41922"/>
+              <a:ext cx="3141835" cy="6816077"/>
+            </a:xfrm>
+            <a:prstGeom prst="rect">
+              <a:avLst/>
+            </a:prstGeom>
+          </p:spPr>
+        </p:pic>
+      </p:grpSp>
       <p:sp>
         <p:nvSpPr>
           <p:cNvPr id="2" name="Title 1">
@@ -5078,12 +5367,18 @@
             <p:ph type="title"/>
           </p:nvPr>
         </p:nvSpPr>
-        <p:spPr/>
-        <p:txBody>
-          <a:bodyPr/>
-          <a:lstStyle/>
-          <a:p>
-            <a:pPr algn="ctr"/>
+        <p:spPr>
+          <a:xfrm>
+            <a:off x="609601" y="559813"/>
+            <a:ext cx="5181599" cy="5612387"/>
+          </a:xfrm>
+        </p:spPr>
+        <p:txBody>
+          <a:bodyPr anchor="ctr">
+            <a:normAutofit/>
+          </a:bodyPr>
+          <a:lstStyle/>
+          <a:p>
             <a:r>
               <a:rPr lang="en-US" dirty="0"/>
               <a:t>ETL process</a:t>
@@ -5109,15 +5404,122 @@
         </p:nvSpPr>
         <p:spPr>
           <a:xfrm>
-            <a:off x="458694" y="1440494"/>
-            <a:ext cx="11274612" cy="5160722"/>
+            <a:off x="6465967" y="234863"/>
+            <a:ext cx="5180106" cy="6388273"/>
           </a:xfrm>
         </p:spPr>
         <p:txBody>
-          <a:bodyPr/>
-          <a:lstStyle/>
-          <a:p>
-            <a:endParaRPr lang="en-US" dirty="0"/>
+          <a:bodyPr anchor="ctr">
+            <a:normAutofit fontScale="92500" lnSpcReduction="10000"/>
+          </a:bodyPr>
+          <a:lstStyle/>
+          <a:p>
+            <a:pPr>
+              <a:lnSpc>
+                <a:spcPct val="100000"/>
+              </a:lnSpc>
+            </a:pPr>
+            <a:r>
+              <a:rPr lang="en-US" sz="1800" dirty="0"/>
+              <a:t>Extraction:</a:t>
+            </a:r>
+          </a:p>
+          <a:p>
+            <a:pPr lvl="1">
+              <a:lnSpc>
+                <a:spcPct val="100000"/>
+              </a:lnSpc>
+            </a:pPr>
+            <a:r>
+              <a:rPr lang="en-US" sz="1800" dirty="0"/>
+              <a:t>Data extraction from both life_expectancy.csv and continents.csv file.</a:t>
+            </a:r>
+          </a:p>
+          <a:p>
+            <a:pPr lvl="1">
+              <a:lnSpc>
+                <a:spcPct val="100000"/>
+              </a:lnSpc>
+            </a:pPr>
+            <a:r>
+              <a:rPr lang="en-US" sz="1800" dirty="0"/>
+              <a:t>The column names in the csv files has spaces and sorts of issues, which needed to be cleaned up.</a:t>
+            </a:r>
+          </a:p>
+          <a:p>
+            <a:pPr marL="228600" lvl="1">
+              <a:lnSpc>
+                <a:spcPct val="100000"/>
+              </a:lnSpc>
+              <a:spcBef>
+                <a:spcPts val="1000"/>
+              </a:spcBef>
+            </a:pPr>
+            <a:r>
+              <a:rPr lang="en-US" sz="1800" dirty="0"/>
+              <a:t>Transform:</a:t>
+            </a:r>
+          </a:p>
+          <a:p>
+            <a:pPr lvl="1">
+              <a:lnSpc>
+                <a:spcPct val="100000"/>
+              </a:lnSpc>
+            </a:pPr>
+            <a:r>
+              <a:rPr lang="en-US" sz="1800" dirty="0"/>
+              <a:t>Using python code, the data from both the </a:t>
+            </a:r>
+            <a:r>
+              <a:rPr lang="en-US" sz="1800" dirty="0" err="1"/>
+              <a:t>csvs</a:t>
+            </a:r>
+            <a:r>
+              <a:rPr lang="en-US" sz="1800" dirty="0"/>
+              <a:t> were cleaned, and merged based on the country columns, so the retrieved data can be matched as per continents and countries.</a:t>
+            </a:r>
+          </a:p>
+          <a:p>
+            <a:pPr marL="228600" lvl="1">
+              <a:lnSpc>
+                <a:spcPct val="100000"/>
+              </a:lnSpc>
+              <a:spcBef>
+                <a:spcPts val="1000"/>
+              </a:spcBef>
+            </a:pPr>
+            <a:r>
+              <a:rPr lang="en-US" sz="1800" dirty="0"/>
+              <a:t>Load:</a:t>
+            </a:r>
+          </a:p>
+          <a:p>
+            <a:pPr marL="685800" lvl="2">
+              <a:lnSpc>
+                <a:spcPct val="100000"/>
+              </a:lnSpc>
+              <a:spcBef>
+                <a:spcPts val="1000"/>
+              </a:spcBef>
+            </a:pPr>
+            <a:r>
+              <a:rPr lang="en-US" sz="1800" dirty="0"/>
+              <a:t>The database used to load data into is SQLite. We had issues loading and viewing the data using SQLite, as we were trying to load data into database using our pandas code rather than creating schema and loading data. </a:t>
+            </a:r>
+          </a:p>
+          <a:p>
+            <a:pPr marL="685800" lvl="2">
+              <a:lnSpc>
+                <a:spcPct val="100000"/>
+              </a:lnSpc>
+              <a:spcBef>
+                <a:spcPts val="1000"/>
+              </a:spcBef>
+            </a:pPr>
+            <a:r>
+              <a:rPr lang="en-US" sz="1800" dirty="0"/>
+              <a:t>After a lot of research and help from all the available resources, we were able to successfully load and view the data into SQLite database.</a:t>
+            </a:r>
           </a:p>
         </p:txBody>
       </p:sp>
@@ -5135,6 +5537,446 @@
 </file>
 
 <file path=ppt/slides/slide5.xml><?xml version="1.0" encoding="utf-8"?>
+<p:sld xmlns:a="http://schemas.openxmlformats.org/drawingml/2006/main" xmlns:r="http://schemas.openxmlformats.org/officeDocument/2006/relationships" xmlns:p="http://schemas.openxmlformats.org/presentationml/2006/main">
+  <p:cSld>
+    <p:bg>
+      <p:bgPr>
+        <a:blipFill>
+          <a:blip r:embed="rId2"/>
+          <a:tile tx="0" ty="0" sx="100000" sy="100000" flip="none" algn="tl"/>
+        </a:blipFill>
+        <a:effectLst/>
+      </p:bgPr>
+    </p:bg>
+    <p:spTree>
+      <p:nvGrpSpPr>
+        <p:cNvPr id="1" name=""/>
+        <p:cNvGrpSpPr/>
+        <p:nvPr/>
+      </p:nvGrpSpPr>
+      <p:grpSpPr>
+        <a:xfrm>
+          <a:off x="0" y="0"/>
+          <a:ext cx="0" cy="0"/>
+          <a:chOff x="0" y="0"/>
+          <a:chExt cx="0" cy="0"/>
+        </a:xfrm>
+      </p:grpSpPr>
+      <p:sp useBgFill="1">
+        <p:nvSpPr>
+          <p:cNvPr id="8" name="Rectangle 7">
+            <a:extLst>
+              <a:ext uri="{FF2B5EF4-FFF2-40B4-BE49-F238E27FC236}">
+                <a16:creationId xmlns:a16="http://schemas.microsoft.com/office/drawing/2014/main" id="{8651CFA9-6065-4243-AC48-858E359780B1}"/>
+              </a:ext>
+              <a:ext uri="{C183D7F6-B498-43B3-948B-1728B52AA6E4}">
+                <adec:decorative xmlns:adec="http://schemas.microsoft.com/office/drawing/2017/decorative" val="1"/>
+              </a:ext>
+            </a:extLst>
+          </p:cNvPr>
+          <p:cNvSpPr>
+            <a:spLocks noGrp="1" noRot="1" noChangeAspect="1" noMove="1" noResize="1" noEditPoints="1" noAdjustHandles="1" noChangeArrowheads="1" noChangeShapeType="1" noTextEdit="1"/>
+          </p:cNvSpPr>
+          <p:nvPr>
+            <p:extLst>
+              <p:ext uri="{386F3935-93C4-4BCD-93E2-E3B085C9AB24}">
+                <p16:designElem xmlns:p16="http://schemas.microsoft.com/office/powerpoint/2015/main" val="1"/>
+              </p:ext>
+            </p:extLst>
+          </p:nvPr>
+        </p:nvSpPr>
+        <p:spPr>
+          <a:xfrm>
+            <a:off x="0" y="0"/>
+            <a:ext cx="12192000" cy="6858000"/>
+          </a:xfrm>
+          <a:prstGeom prst="rect">
+            <a:avLst/>
+          </a:prstGeom>
+          <a:ln>
+            <a:noFill/>
+          </a:ln>
+        </p:spPr>
+        <p:style>
+          <a:lnRef idx="2">
+            <a:schemeClr val="accent1">
+              <a:shade val="50000"/>
+            </a:schemeClr>
+          </a:lnRef>
+          <a:fillRef idx="1">
+            <a:schemeClr val="accent1"/>
+          </a:fillRef>
+          <a:effectRef idx="0">
+            <a:schemeClr val="accent1"/>
+          </a:effectRef>
+          <a:fontRef idx="minor">
+            <a:schemeClr val="lt1"/>
+          </a:fontRef>
+        </p:style>
+        <p:txBody>
+          <a:bodyPr rtlCol="0" anchor="ctr"/>
+          <a:lstStyle/>
+          <a:p>
+            <a:pPr algn="ctr"/>
+            <a:endParaRPr lang="en-US">
+              <a:solidFill>
+                <a:schemeClr val="tx1">
+                  <a:lumMod val="65000"/>
+                  <a:lumOff val="35000"/>
+                </a:schemeClr>
+              </a:solidFill>
+              <a:latin typeface="AvenirNext LT Pro Medium" panose="020B0504020202020204" pitchFamily="34" charset="0"/>
+            </a:endParaRPr>
+          </a:p>
+        </p:txBody>
+      </p:sp>
+      <p:sp>
+        <p:nvSpPr>
+          <p:cNvPr id="10" name="Rectangle 9">
+            <a:extLst>
+              <a:ext uri="{FF2B5EF4-FFF2-40B4-BE49-F238E27FC236}">
+                <a16:creationId xmlns:a16="http://schemas.microsoft.com/office/drawing/2014/main" id="{37962AE0-6A1C-4B76-9D52-10E5E6D7D3BB}"/>
+              </a:ext>
+              <a:ext uri="{C183D7F6-B498-43B3-948B-1728B52AA6E4}">
+                <adec:decorative xmlns:adec="http://schemas.microsoft.com/office/drawing/2017/decorative" val="1"/>
+              </a:ext>
+            </a:extLst>
+          </p:cNvPr>
+          <p:cNvSpPr>
+            <a:spLocks noGrp="1" noRot="1" noChangeAspect="1" noMove="1" noResize="1" noEditPoints="1" noAdjustHandles="1" noChangeArrowheads="1" noChangeShapeType="1" noTextEdit="1"/>
+          </p:cNvSpPr>
+          <p:nvPr>
+            <p:extLst>
+              <p:ext uri="{386F3935-93C4-4BCD-93E2-E3B085C9AB24}">
+                <p16:designElem xmlns:p16="http://schemas.microsoft.com/office/powerpoint/2015/main" val="1"/>
+              </p:ext>
+            </p:extLst>
+          </p:nvPr>
+        </p:nvSpPr>
+        <p:spPr>
+          <a:xfrm>
+            <a:off x="0" y="0"/>
+            <a:ext cx="6095999" cy="6858000"/>
+          </a:xfrm>
+          <a:prstGeom prst="rect">
+            <a:avLst/>
+          </a:prstGeom>
+          <a:solidFill>
+            <a:schemeClr val="bg2">
+              <a:lumMod val="90000"/>
+              <a:alpha val="70000"/>
+            </a:schemeClr>
+          </a:solidFill>
+          <a:ln>
+            <a:noFill/>
+          </a:ln>
+        </p:spPr>
+        <p:style>
+          <a:lnRef idx="2">
+            <a:schemeClr val="accent1">
+              <a:shade val="50000"/>
+            </a:schemeClr>
+          </a:lnRef>
+          <a:fillRef idx="1">
+            <a:schemeClr val="accent1"/>
+          </a:fillRef>
+          <a:effectRef idx="0">
+            <a:schemeClr val="accent1"/>
+          </a:effectRef>
+          <a:fontRef idx="minor">
+            <a:schemeClr val="lt1"/>
+          </a:fontRef>
+        </p:style>
+        <p:txBody>
+          <a:bodyPr rtlCol="0" anchor="ctr"/>
+          <a:lstStyle/>
+          <a:p>
+            <a:pPr algn="ctr"/>
+            <a:endParaRPr lang="en-US">
+              <a:solidFill>
+                <a:schemeClr val="tx1">
+                  <a:lumMod val="65000"/>
+                  <a:lumOff val="35000"/>
+                </a:schemeClr>
+              </a:solidFill>
+              <a:latin typeface="AvenirNext LT Pro Medium" panose="020B0504020202020204" pitchFamily="34" charset="0"/>
+            </a:endParaRPr>
+          </a:p>
+        </p:txBody>
+      </p:sp>
+      <p:grpSp>
+        <p:nvGrpSpPr>
+          <p:cNvPr id="12" name="Group 11">
+            <a:extLst>
+              <a:ext uri="{FF2B5EF4-FFF2-40B4-BE49-F238E27FC236}">
+                <a16:creationId xmlns:a16="http://schemas.microsoft.com/office/drawing/2014/main" id="{60D82D56-D377-48D4-8DE9-6A0A8DB5E31D}"/>
+              </a:ext>
+              <a:ext uri="{C183D7F6-B498-43B3-948B-1728B52AA6E4}">
+                <adec:decorative xmlns:adec="http://schemas.microsoft.com/office/drawing/2017/decorative" val="1"/>
+              </a:ext>
+            </a:extLst>
+          </p:cNvPr>
+          <p:cNvGrpSpPr>
+            <a:grpSpLocks noGrp="1" noUngrp="1" noRot="1" noChangeAspect="1" noMove="1" noResize="1"/>
+          </p:cNvGrpSpPr>
+          <p:nvPr>
+            <p:extLst>
+              <p:ext uri="{386F3935-93C4-4BCD-93E2-E3B085C9AB24}">
+                <p16:designElem xmlns:p16="http://schemas.microsoft.com/office/powerpoint/2015/main" val="1"/>
+              </p:ext>
+            </p:extLst>
+          </p:nvPr>
+        </p:nvGrpSpPr>
+        <p:grpSpPr>
+          <a:xfrm rot="10800000">
+            <a:off x="1" y="-2"/>
+            <a:ext cx="2696853" cy="4598233"/>
+            <a:chOff x="8059620" y="41922"/>
+            <a:chExt cx="3997615" cy="6816077"/>
+          </a:xfrm>
+        </p:grpSpPr>
+        <p:pic>
+          <p:nvPicPr>
+            <p:cNvPr id="13" name="Picture 12">
+              <a:extLst>
+                <a:ext uri="{FF2B5EF4-FFF2-40B4-BE49-F238E27FC236}">
+                  <a16:creationId xmlns:a16="http://schemas.microsoft.com/office/drawing/2014/main" id="{6D8CD235-5DAC-4779-B652-AEF90B9844AF}"/>
+                </a:ext>
+                <a:ext uri="{C183D7F6-B498-43B3-948B-1728B52AA6E4}">
+                  <adec:decorative xmlns:adec="http://schemas.microsoft.com/office/drawing/2017/decorative" val="1"/>
+                </a:ext>
+              </a:extLst>
+            </p:cNvPr>
+            <p:cNvPicPr>
+              <a:picLocks noChangeAspect="1"/>
+            </p:cNvPicPr>
+            <p:nvPr>
+              <p:extLst>
+                <p:ext uri="{386F3935-93C4-4BCD-93E2-E3B085C9AB24}">
+                  <p16:designElem xmlns:p16="http://schemas.microsoft.com/office/powerpoint/2015/main" val="1"/>
+                </p:ext>
+              </p:extLst>
+            </p:nvPr>
+          </p:nvPicPr>
+          <p:blipFill rotWithShape="1">
+            <a:blip r:embed="rId3">
+              <a:duotone>
+                <a:schemeClr val="accent6">
+                  <a:shade val="45000"/>
+                  <a:satMod val="135000"/>
+                </a:schemeClr>
+                <a:prstClr val="white"/>
+              </a:duotone>
+              <a:alphaModFix amt="7000"/>
+              <a:extLst>
+                <a:ext uri="{28A0092B-C50C-407E-A947-70E740481C1C}">
+                  <a14:useLocalDpi xmlns:a14="http://schemas.microsoft.com/office/drawing/2010/main" val="0"/>
+                </a:ext>
+              </a:extLst>
+            </a:blip>
+            <a:srcRect l="22818" b="17291"/>
+            <a:stretch/>
+          </p:blipFill>
+          <p:spPr>
+            <a:xfrm flipH="1">
+              <a:off x="8059620" y="1345934"/>
+              <a:ext cx="3997615" cy="5512065"/>
+            </a:xfrm>
+            <a:prstGeom prst="rect">
+              <a:avLst/>
+            </a:prstGeom>
+          </p:spPr>
+        </p:pic>
+        <p:pic>
+          <p:nvPicPr>
+            <p:cNvPr id="14" name="Picture 13">
+              <a:extLst>
+                <a:ext uri="{FF2B5EF4-FFF2-40B4-BE49-F238E27FC236}">
+                  <a16:creationId xmlns:a16="http://schemas.microsoft.com/office/drawing/2014/main" id="{9048802B-B281-498F-88C5-E240B74438CE}"/>
+                </a:ext>
+                <a:ext uri="{C183D7F6-B498-43B3-948B-1728B52AA6E4}">
+                  <adec:decorative xmlns:adec="http://schemas.microsoft.com/office/drawing/2017/decorative" val="1"/>
+                </a:ext>
+              </a:extLst>
+            </p:cNvPr>
+            <p:cNvPicPr>
+              <a:picLocks noChangeAspect="1"/>
+            </p:cNvPicPr>
+            <p:nvPr>
+              <p:extLst>
+                <p:ext uri="{386F3935-93C4-4BCD-93E2-E3B085C9AB24}">
+                  <p16:designElem xmlns:p16="http://schemas.microsoft.com/office/powerpoint/2015/main" val="1"/>
+                </p:ext>
+              </p:extLst>
+            </p:nvPr>
+          </p:nvPicPr>
+          <p:blipFill rotWithShape="1">
+            <a:blip r:embed="rId3">
+              <a:duotone>
+                <a:schemeClr val="accent6">
+                  <a:shade val="45000"/>
+                  <a:satMod val="135000"/>
+                </a:schemeClr>
+                <a:prstClr val="white"/>
+              </a:duotone>
+              <a:alphaModFix amt="15000"/>
+              <a:extLst>
+                <a:ext uri="{28A0092B-C50C-407E-A947-70E740481C1C}">
+                  <a14:useLocalDpi xmlns:a14="http://schemas.microsoft.com/office/drawing/2010/main" val="0"/>
+                </a:ext>
+              </a:extLst>
+            </a:blip>
+            <a:srcRect r="40690"/>
+            <a:stretch/>
+          </p:blipFill>
+          <p:spPr>
+            <a:xfrm>
+              <a:off x="8915400" y="41922"/>
+              <a:ext cx="3141835" cy="6816077"/>
+            </a:xfrm>
+            <a:prstGeom prst="rect">
+              <a:avLst/>
+            </a:prstGeom>
+          </p:spPr>
+        </p:pic>
+      </p:grpSp>
+      <p:sp>
+        <p:nvSpPr>
+          <p:cNvPr id="2" name="Title 1">
+            <a:extLst>
+              <a:ext uri="{FF2B5EF4-FFF2-40B4-BE49-F238E27FC236}">
+                <a16:creationId xmlns:a16="http://schemas.microsoft.com/office/drawing/2014/main" id="{C7B2B952-E4BE-4546-995C-34CF16E4031D}"/>
+              </a:ext>
+            </a:extLst>
+          </p:cNvPr>
+          <p:cNvSpPr>
+            <a:spLocks noGrp="1"/>
+          </p:cNvSpPr>
+          <p:nvPr>
+            <p:ph type="title"/>
+          </p:nvPr>
+        </p:nvSpPr>
+        <p:spPr>
+          <a:xfrm>
+            <a:off x="609601" y="559813"/>
+            <a:ext cx="5181599" cy="5612387"/>
+          </a:xfrm>
+        </p:spPr>
+        <p:txBody>
+          <a:bodyPr anchor="ctr">
+            <a:normAutofit/>
+          </a:bodyPr>
+          <a:lstStyle/>
+          <a:p>
+            <a:r>
+              <a:rPr lang="en-US" dirty="0"/>
+              <a:t>Challenges</a:t>
+            </a:r>
+          </a:p>
+        </p:txBody>
+      </p:sp>
+      <p:sp>
+        <p:nvSpPr>
+          <p:cNvPr id="3" name="Content Placeholder 2">
+            <a:extLst>
+              <a:ext uri="{FF2B5EF4-FFF2-40B4-BE49-F238E27FC236}">
+                <a16:creationId xmlns:a16="http://schemas.microsoft.com/office/drawing/2014/main" id="{6391858A-CC1A-7247-AC04-B65316DFDC62}"/>
+              </a:ext>
+            </a:extLst>
+          </p:cNvPr>
+          <p:cNvSpPr>
+            <a:spLocks noGrp="1"/>
+          </p:cNvSpPr>
+          <p:nvPr>
+            <p:ph idx="1"/>
+          </p:nvPr>
+        </p:nvSpPr>
+        <p:spPr>
+          <a:xfrm>
+            <a:off x="6477000" y="559813"/>
+            <a:ext cx="5180106" cy="5612387"/>
+          </a:xfrm>
+        </p:spPr>
+        <p:txBody>
+          <a:bodyPr anchor="ctr">
+            <a:normAutofit/>
+          </a:bodyPr>
+          <a:lstStyle/>
+          <a:p>
+            <a:r>
+              <a:rPr lang="en-US" sz="1800" dirty="0"/>
+              <a:t>Loading and reading data into SQLite database, instead of using </a:t>
+            </a:r>
+            <a:r>
+              <a:rPr lang="en-US" sz="1800" dirty="0" err="1"/>
+              <a:t>PostGres</a:t>
+            </a:r>
+            <a:r>
+              <a:rPr lang="en-US" sz="1800" dirty="0"/>
+              <a:t> SQL database.</a:t>
+            </a:r>
+            <a:br>
+              <a:rPr lang="en-US" sz="1800" dirty="0"/>
+            </a:br>
+            <a:r>
+              <a:rPr lang="en-US" sz="1800" dirty="0"/>
+              <a:t>As we used pandas to create the database, and not </a:t>
+            </a:r>
+            <a:r>
+              <a:rPr lang="en-US" sz="1800" dirty="0" err="1"/>
+              <a:t>schema.sql</a:t>
+            </a:r>
+            <a:r>
+              <a:rPr lang="en-US" sz="1800" dirty="0"/>
+              <a:t> – lot of research and resources were used to make SQLite work and load the data.</a:t>
+            </a:r>
+          </a:p>
+          <a:p>
+            <a:r>
+              <a:rPr lang="en-US" sz="1800" dirty="0"/>
+              <a:t>Creating Flask app to connect to SQLite database and retrieve data.</a:t>
+            </a:r>
+          </a:p>
+          <a:p>
+            <a:r>
+              <a:rPr lang="en-US" sz="1800" dirty="0" err="1"/>
+              <a:t>Jsonify-ing</a:t>
+            </a:r>
+            <a:r>
+              <a:rPr lang="en-US" sz="1800" dirty="0"/>
+              <a:t> the data from the database and render it to a HTML page.</a:t>
+            </a:r>
+          </a:p>
+          <a:p>
+            <a:r>
+              <a:rPr lang="en-US" sz="1800" dirty="0"/>
+              <a:t>Connecting the Flask app and </a:t>
+            </a:r>
+            <a:r>
+              <a:rPr lang="en-US" sz="1800" dirty="0" err="1"/>
+              <a:t>app_new.js</a:t>
+            </a:r>
+            <a:r>
+              <a:rPr lang="en-US" sz="1800" dirty="0"/>
+              <a:t> file to retrieve data as json, to display the results as an output visualization.</a:t>
+            </a:r>
+          </a:p>
+        </p:txBody>
+      </p:sp>
+    </p:spTree>
+    <p:extLst>
+      <p:ext uri="{BB962C8B-B14F-4D97-AF65-F5344CB8AC3E}">
+        <p14:creationId xmlns:p14="http://schemas.microsoft.com/office/powerpoint/2010/main" val="1968627579"/>
+      </p:ext>
+    </p:extLst>
+  </p:cSld>
+  <p:clrMapOvr>
+    <a:masterClrMapping/>
+  </p:clrMapOvr>
+</p:sld>
+</file>
+
+<file path=ppt/slides/slide6.xml><?xml version="1.0" encoding="utf-8"?>
 <p:sld xmlns:a="http://schemas.openxmlformats.org/drawingml/2006/main" xmlns:r="http://schemas.openxmlformats.org/officeDocument/2006/relationships" xmlns:p="http://schemas.openxmlformats.org/presentationml/2006/main">
   <p:cSld>
     <p:bg>

</xml_diff>

<commit_message>
changed link in ppt
</commit_message>
<xml_diff>
--- a/Proposal Presentation/Life Expectancy presentation.pptx
+++ b/Proposal Presentation/Life Expectancy presentation.pptx
@@ -4,6 +4,9 @@
   <p:sldMasterIdLst>
     <p:sldMasterId id="2147483775" r:id="rId1"/>
   </p:sldMasterIdLst>
+  <p:notesMasterIdLst>
+    <p:notesMasterId r:id="rId9"/>
+  </p:notesMasterIdLst>
   <p:sldIdLst>
     <p:sldId id="256" r:id="rId2"/>
     <p:sldId id="257" r:id="rId3"/>
@@ -118,6 +121,439 @@
 </p:presentation>
 </file>
 
+<file path=ppt/notesMasters/notesMaster1.xml><?xml version="1.0" encoding="utf-8"?>
+<p:notesMaster xmlns:a="http://schemas.openxmlformats.org/drawingml/2006/main" xmlns:r="http://schemas.openxmlformats.org/officeDocument/2006/relationships" xmlns:p="http://schemas.openxmlformats.org/presentationml/2006/main">
+  <p:cSld>
+    <p:bg>
+      <p:bgRef idx="1001">
+        <a:schemeClr val="bg1"/>
+      </p:bgRef>
+    </p:bg>
+    <p:spTree>
+      <p:nvGrpSpPr>
+        <p:cNvPr id="1" name=""/>
+        <p:cNvGrpSpPr/>
+        <p:nvPr/>
+      </p:nvGrpSpPr>
+      <p:grpSpPr>
+        <a:xfrm>
+          <a:off x="0" y="0"/>
+          <a:ext cx="0" cy="0"/>
+          <a:chOff x="0" y="0"/>
+          <a:chExt cx="0" cy="0"/>
+        </a:xfrm>
+      </p:grpSpPr>
+      <p:sp>
+        <p:nvSpPr>
+          <p:cNvPr id="2" name="Header Placeholder 1"/>
+          <p:cNvSpPr>
+            <a:spLocks noGrp="1"/>
+          </p:cNvSpPr>
+          <p:nvPr>
+            <p:ph type="hdr" sz="quarter"/>
+          </p:nvPr>
+        </p:nvSpPr>
+        <p:spPr>
+          <a:xfrm>
+            <a:off x="0" y="0"/>
+            <a:ext cx="2971800" cy="458788"/>
+          </a:xfrm>
+          <a:prstGeom prst="rect">
+            <a:avLst/>
+          </a:prstGeom>
+        </p:spPr>
+        <p:txBody>
+          <a:bodyPr vert="horz" lIns="91440" tIns="45720" rIns="91440" bIns="45720" rtlCol="0"/>
+          <a:lstStyle>
+            <a:lvl1pPr algn="l">
+              <a:defRPr sz="1200"/>
+            </a:lvl1pPr>
+          </a:lstStyle>
+          <a:p>
+            <a:endParaRPr lang="en-US"/>
+          </a:p>
+        </p:txBody>
+      </p:sp>
+      <p:sp>
+        <p:nvSpPr>
+          <p:cNvPr id="3" name="Date Placeholder 2"/>
+          <p:cNvSpPr>
+            <a:spLocks noGrp="1"/>
+          </p:cNvSpPr>
+          <p:nvPr>
+            <p:ph type="dt" idx="1"/>
+          </p:nvPr>
+        </p:nvSpPr>
+        <p:spPr>
+          <a:xfrm>
+            <a:off x="3884613" y="0"/>
+            <a:ext cx="2971800" cy="458788"/>
+          </a:xfrm>
+          <a:prstGeom prst="rect">
+            <a:avLst/>
+          </a:prstGeom>
+        </p:spPr>
+        <p:txBody>
+          <a:bodyPr vert="horz" lIns="91440" tIns="45720" rIns="91440" bIns="45720" rtlCol="0"/>
+          <a:lstStyle>
+            <a:lvl1pPr algn="r">
+              <a:defRPr sz="1200"/>
+            </a:lvl1pPr>
+          </a:lstStyle>
+          <a:p>
+            <a:fld id="{8E81735D-A8F1-C94A-AD3E-54BE72F7CEF6}" type="datetimeFigureOut">
+              <a:rPr lang="en-US" smtClean="0"/>
+              <a:t>9/13/21</a:t>
+            </a:fld>
+            <a:endParaRPr lang="en-US"/>
+          </a:p>
+        </p:txBody>
+      </p:sp>
+      <p:sp>
+        <p:nvSpPr>
+          <p:cNvPr id="4" name="Slide Image Placeholder 3"/>
+          <p:cNvSpPr>
+            <a:spLocks noGrp="1" noRot="1" noChangeAspect="1"/>
+          </p:cNvSpPr>
+          <p:nvPr>
+            <p:ph type="sldImg" idx="2"/>
+          </p:nvPr>
+        </p:nvSpPr>
+        <p:spPr>
+          <a:xfrm>
+            <a:off x="685800" y="1143000"/>
+            <a:ext cx="5486400" cy="3086100"/>
+          </a:xfrm>
+          <a:prstGeom prst="rect">
+            <a:avLst/>
+          </a:prstGeom>
+          <a:noFill/>
+          <a:ln w="12700">
+            <a:solidFill>
+              <a:prstClr val="black"/>
+            </a:solidFill>
+          </a:ln>
+        </p:spPr>
+        <p:txBody>
+          <a:bodyPr vert="horz" lIns="91440" tIns="45720" rIns="91440" bIns="45720" rtlCol="0" anchor="ctr"/>
+          <a:lstStyle/>
+          <a:p>
+            <a:endParaRPr lang="en-US"/>
+          </a:p>
+        </p:txBody>
+      </p:sp>
+      <p:sp>
+        <p:nvSpPr>
+          <p:cNvPr id="5" name="Notes Placeholder 4"/>
+          <p:cNvSpPr>
+            <a:spLocks noGrp="1"/>
+          </p:cNvSpPr>
+          <p:nvPr>
+            <p:ph type="body" sz="quarter" idx="3"/>
+          </p:nvPr>
+        </p:nvSpPr>
+        <p:spPr>
+          <a:xfrm>
+            <a:off x="685800" y="4400550"/>
+            <a:ext cx="5486400" cy="3600450"/>
+          </a:xfrm>
+          <a:prstGeom prst="rect">
+            <a:avLst/>
+          </a:prstGeom>
+        </p:spPr>
+        <p:txBody>
+          <a:bodyPr vert="horz" lIns="91440" tIns="45720" rIns="91440" bIns="45720" rtlCol="0"/>
+          <a:lstStyle/>
+          <a:p>
+            <a:pPr lvl="0"/>
+            <a:r>
+              <a:rPr lang="en-US"/>
+              <a:t>Click to edit Master text styles</a:t>
+            </a:r>
+          </a:p>
+          <a:p>
+            <a:pPr lvl="1"/>
+            <a:r>
+              <a:rPr lang="en-US"/>
+              <a:t>Second level</a:t>
+            </a:r>
+          </a:p>
+          <a:p>
+            <a:pPr lvl="2"/>
+            <a:r>
+              <a:rPr lang="en-US"/>
+              <a:t>Third level</a:t>
+            </a:r>
+          </a:p>
+          <a:p>
+            <a:pPr lvl="3"/>
+            <a:r>
+              <a:rPr lang="en-US"/>
+              <a:t>Fourth level</a:t>
+            </a:r>
+          </a:p>
+          <a:p>
+            <a:pPr lvl="4"/>
+            <a:r>
+              <a:rPr lang="en-US"/>
+              <a:t>Fifth level</a:t>
+            </a:r>
+          </a:p>
+        </p:txBody>
+      </p:sp>
+      <p:sp>
+        <p:nvSpPr>
+          <p:cNvPr id="6" name="Footer Placeholder 5"/>
+          <p:cNvSpPr>
+            <a:spLocks noGrp="1"/>
+          </p:cNvSpPr>
+          <p:nvPr>
+            <p:ph type="ftr" sz="quarter" idx="4"/>
+          </p:nvPr>
+        </p:nvSpPr>
+        <p:spPr>
+          <a:xfrm>
+            <a:off x="0" y="8685213"/>
+            <a:ext cx="2971800" cy="458787"/>
+          </a:xfrm>
+          <a:prstGeom prst="rect">
+            <a:avLst/>
+          </a:prstGeom>
+        </p:spPr>
+        <p:txBody>
+          <a:bodyPr vert="horz" lIns="91440" tIns="45720" rIns="91440" bIns="45720" rtlCol="0" anchor="b"/>
+          <a:lstStyle>
+            <a:lvl1pPr algn="l">
+              <a:defRPr sz="1200"/>
+            </a:lvl1pPr>
+          </a:lstStyle>
+          <a:p>
+            <a:endParaRPr lang="en-US"/>
+          </a:p>
+        </p:txBody>
+      </p:sp>
+      <p:sp>
+        <p:nvSpPr>
+          <p:cNvPr id="7" name="Slide Number Placeholder 6"/>
+          <p:cNvSpPr>
+            <a:spLocks noGrp="1"/>
+          </p:cNvSpPr>
+          <p:nvPr>
+            <p:ph type="sldNum" sz="quarter" idx="5"/>
+          </p:nvPr>
+        </p:nvSpPr>
+        <p:spPr>
+          <a:xfrm>
+            <a:off x="3884613" y="8685213"/>
+            <a:ext cx="2971800" cy="458787"/>
+          </a:xfrm>
+          <a:prstGeom prst="rect">
+            <a:avLst/>
+          </a:prstGeom>
+        </p:spPr>
+        <p:txBody>
+          <a:bodyPr vert="horz" lIns="91440" tIns="45720" rIns="91440" bIns="45720" rtlCol="0" anchor="b"/>
+          <a:lstStyle>
+            <a:lvl1pPr algn="r">
+              <a:defRPr sz="1200"/>
+            </a:lvl1pPr>
+          </a:lstStyle>
+          <a:p>
+            <a:fld id="{A0F6E684-7FB4-B744-8175-C2F551BDB430}" type="slidenum">
+              <a:rPr lang="en-US" smtClean="0"/>
+              <a:t>‹#›</a:t>
+            </a:fld>
+            <a:endParaRPr lang="en-US"/>
+          </a:p>
+        </p:txBody>
+      </p:sp>
+    </p:spTree>
+    <p:extLst>
+      <p:ext uri="{BB962C8B-B14F-4D97-AF65-F5344CB8AC3E}">
+        <p14:creationId xmlns:p14="http://schemas.microsoft.com/office/powerpoint/2010/main" val="1104682790"/>
+      </p:ext>
+    </p:extLst>
+  </p:cSld>
+  <p:clrMap bg1="lt1" tx1="dk1" bg2="lt2" tx2="dk2" accent1="accent1" accent2="accent2" accent3="accent3" accent4="accent4" accent5="accent5" accent6="accent6" hlink="hlink" folHlink="folHlink"/>
+  <p:notesStyle>
+    <a:lvl1pPr marL="0" algn="l" defTabSz="914400" rtl="0" eaLnBrk="1" latinLnBrk="0" hangingPunct="1">
+      <a:defRPr sz="1200" kern="1200">
+        <a:solidFill>
+          <a:schemeClr val="tx1"/>
+        </a:solidFill>
+        <a:latin typeface="+mn-lt"/>
+        <a:ea typeface="+mn-ea"/>
+        <a:cs typeface="+mn-cs"/>
+      </a:defRPr>
+    </a:lvl1pPr>
+    <a:lvl2pPr marL="457200" algn="l" defTabSz="914400" rtl="0" eaLnBrk="1" latinLnBrk="0" hangingPunct="1">
+      <a:defRPr sz="1200" kern="1200">
+        <a:solidFill>
+          <a:schemeClr val="tx1"/>
+        </a:solidFill>
+        <a:latin typeface="+mn-lt"/>
+        <a:ea typeface="+mn-ea"/>
+        <a:cs typeface="+mn-cs"/>
+      </a:defRPr>
+    </a:lvl2pPr>
+    <a:lvl3pPr marL="914400" algn="l" defTabSz="914400" rtl="0" eaLnBrk="1" latinLnBrk="0" hangingPunct="1">
+      <a:defRPr sz="1200" kern="1200">
+        <a:solidFill>
+          <a:schemeClr val="tx1"/>
+        </a:solidFill>
+        <a:latin typeface="+mn-lt"/>
+        <a:ea typeface="+mn-ea"/>
+        <a:cs typeface="+mn-cs"/>
+      </a:defRPr>
+    </a:lvl3pPr>
+    <a:lvl4pPr marL="1371600" algn="l" defTabSz="914400" rtl="0" eaLnBrk="1" latinLnBrk="0" hangingPunct="1">
+      <a:defRPr sz="1200" kern="1200">
+        <a:solidFill>
+          <a:schemeClr val="tx1"/>
+        </a:solidFill>
+        <a:latin typeface="+mn-lt"/>
+        <a:ea typeface="+mn-ea"/>
+        <a:cs typeface="+mn-cs"/>
+      </a:defRPr>
+    </a:lvl4pPr>
+    <a:lvl5pPr marL="1828800" algn="l" defTabSz="914400" rtl="0" eaLnBrk="1" latinLnBrk="0" hangingPunct="1">
+      <a:defRPr sz="1200" kern="1200">
+        <a:solidFill>
+          <a:schemeClr val="tx1"/>
+        </a:solidFill>
+        <a:latin typeface="+mn-lt"/>
+        <a:ea typeface="+mn-ea"/>
+        <a:cs typeface="+mn-cs"/>
+      </a:defRPr>
+    </a:lvl5pPr>
+    <a:lvl6pPr marL="2286000" algn="l" defTabSz="914400" rtl="0" eaLnBrk="1" latinLnBrk="0" hangingPunct="1">
+      <a:defRPr sz="1200" kern="1200">
+        <a:solidFill>
+          <a:schemeClr val="tx1"/>
+        </a:solidFill>
+        <a:latin typeface="+mn-lt"/>
+        <a:ea typeface="+mn-ea"/>
+        <a:cs typeface="+mn-cs"/>
+      </a:defRPr>
+    </a:lvl6pPr>
+    <a:lvl7pPr marL="2743200" algn="l" defTabSz="914400" rtl="0" eaLnBrk="1" latinLnBrk="0" hangingPunct="1">
+      <a:defRPr sz="1200" kern="1200">
+        <a:solidFill>
+          <a:schemeClr val="tx1"/>
+        </a:solidFill>
+        <a:latin typeface="+mn-lt"/>
+        <a:ea typeface="+mn-ea"/>
+        <a:cs typeface="+mn-cs"/>
+      </a:defRPr>
+    </a:lvl7pPr>
+    <a:lvl8pPr marL="3200400" algn="l" defTabSz="914400" rtl="0" eaLnBrk="1" latinLnBrk="0" hangingPunct="1">
+      <a:defRPr sz="1200" kern="1200">
+        <a:solidFill>
+          <a:schemeClr val="tx1"/>
+        </a:solidFill>
+        <a:latin typeface="+mn-lt"/>
+        <a:ea typeface="+mn-ea"/>
+        <a:cs typeface="+mn-cs"/>
+      </a:defRPr>
+    </a:lvl8pPr>
+    <a:lvl9pPr marL="3657600" algn="l" defTabSz="914400" rtl="0" eaLnBrk="1" latinLnBrk="0" hangingPunct="1">
+      <a:defRPr sz="1200" kern="1200">
+        <a:solidFill>
+          <a:schemeClr val="tx1"/>
+        </a:solidFill>
+        <a:latin typeface="+mn-lt"/>
+        <a:ea typeface="+mn-ea"/>
+        <a:cs typeface="+mn-cs"/>
+      </a:defRPr>
+    </a:lvl9pPr>
+  </p:notesStyle>
+</p:notesMaster>
+</file>
+
+<file path=ppt/notesSlides/notesSlide1.xml><?xml version="1.0" encoding="utf-8"?>
+<p:notes xmlns:a="http://schemas.openxmlformats.org/drawingml/2006/main" xmlns:r="http://schemas.openxmlformats.org/officeDocument/2006/relationships" xmlns:p="http://schemas.openxmlformats.org/presentationml/2006/main">
+  <p:cSld>
+    <p:spTree>
+      <p:nvGrpSpPr>
+        <p:cNvPr id="1" name=""/>
+        <p:cNvGrpSpPr/>
+        <p:nvPr/>
+      </p:nvGrpSpPr>
+      <p:grpSpPr>
+        <a:xfrm>
+          <a:off x="0" y="0"/>
+          <a:ext cx="0" cy="0"/>
+          <a:chOff x="0" y="0"/>
+          <a:chExt cx="0" cy="0"/>
+        </a:xfrm>
+      </p:grpSpPr>
+      <p:sp>
+        <p:nvSpPr>
+          <p:cNvPr id="2" name="Slide Image Placeholder 1"/>
+          <p:cNvSpPr>
+            <a:spLocks noGrp="1" noRot="1" noChangeAspect="1"/>
+          </p:cNvSpPr>
+          <p:nvPr>
+            <p:ph type="sldImg"/>
+          </p:nvPr>
+        </p:nvSpPr>
+        <p:spPr/>
+      </p:sp>
+      <p:sp>
+        <p:nvSpPr>
+          <p:cNvPr id="3" name="Notes Placeholder 2"/>
+          <p:cNvSpPr>
+            <a:spLocks noGrp="1"/>
+          </p:cNvSpPr>
+          <p:nvPr>
+            <p:ph type="body" idx="1"/>
+          </p:nvPr>
+        </p:nvSpPr>
+        <p:spPr/>
+        <p:txBody>
+          <a:bodyPr/>
+          <a:lstStyle/>
+          <a:p>
+            <a:endParaRPr lang="en-US"/>
+          </a:p>
+        </p:txBody>
+      </p:sp>
+      <p:sp>
+        <p:nvSpPr>
+          <p:cNvPr id="4" name="Slide Number Placeholder 3"/>
+          <p:cNvSpPr>
+            <a:spLocks noGrp="1"/>
+          </p:cNvSpPr>
+          <p:nvPr>
+            <p:ph type="sldNum" sz="quarter" idx="5"/>
+          </p:nvPr>
+        </p:nvSpPr>
+        <p:spPr/>
+        <p:txBody>
+          <a:bodyPr/>
+          <a:lstStyle/>
+          <a:p>
+            <a:fld id="{A0F6E684-7FB4-B744-8175-C2F551BDB430}" type="slidenum">
+              <a:rPr lang="en-US" smtClean="0"/>
+              <a:t>3</a:t>
+            </a:fld>
+            <a:endParaRPr lang="en-US"/>
+          </a:p>
+        </p:txBody>
+      </p:sp>
+    </p:spTree>
+    <p:extLst>
+      <p:ext uri="{BB962C8B-B14F-4D97-AF65-F5344CB8AC3E}">
+        <p14:creationId xmlns:p14="http://schemas.microsoft.com/office/powerpoint/2010/main" val="3170332215"/>
+      </p:ext>
+    </p:extLst>
+  </p:cSld>
+  <p:clrMapOvr>
+    <a:masterClrMapping/>
+  </p:clrMapOvr>
+</p:notes>
+</file>
+
 <file path=ppt/slideLayouts/slideLayout1.xml><?xml version="1.0" encoding="utf-8"?>
 <p:sldLayout xmlns:a="http://schemas.openxmlformats.org/drawingml/2006/main" xmlns:r="http://schemas.openxmlformats.org/officeDocument/2006/relationships" xmlns:p="http://schemas.openxmlformats.org/presentationml/2006/main" type="title" preserve="1">
   <p:cSld name="Title Slide">
@@ -281,7 +717,7 @@
             <a:fld id="{11A6662E-FAF4-44BC-88B5-85A7CBFB6D30}" type="datetime1">
               <a:rPr lang="en-US" smtClean="0"/>
               <a:pPr/>
-              <a:t>9/12/21</a:t>
+              <a:t>9/13/21</a:t>
             </a:fld>
             <a:endParaRPr lang="en-US" dirty="0"/>
           </a:p>
@@ -508,7 +944,7 @@
           <a:p>
             <a:fld id="{4C559632-1575-4E14-B53B-3DC3D5ED3947}" type="datetime1">
               <a:rPr lang="en-US" smtClean="0"/>
-              <a:t>9/12/21</a:t>
+              <a:t>9/13/21</a:t>
             </a:fld>
             <a:endParaRPr lang="en-US"/>
           </a:p>
@@ -716,7 +1152,7 @@
           <a:p>
             <a:fld id="{CC4A6868-2568-4CC9-B302-F37117B01A6E}" type="datetime1">
               <a:rPr lang="en-US" smtClean="0"/>
-              <a:t>9/12/21</a:t>
+              <a:t>9/13/21</a:t>
             </a:fld>
             <a:endParaRPr lang="en-US"/>
           </a:p>
@@ -921,7 +1357,7 @@
           <a:p>
             <a:fld id="{0055F08A-1E71-4B2B-BB49-E743F2903911}" type="datetime1">
               <a:rPr lang="en-US" smtClean="0"/>
-              <a:t>9/12/21</a:t>
+              <a:t>9/13/21</a:t>
             </a:fld>
             <a:endParaRPr lang="en-US" dirty="0"/>
           </a:p>
@@ -1195,7 +1631,7 @@
           <a:p>
             <a:fld id="{15417D9E-721A-44BB-8863-9873FE64DA75}" type="datetime1">
               <a:rPr lang="en-US" smtClean="0"/>
-              <a:t>9/12/21</a:t>
+              <a:t>9/13/21</a:t>
             </a:fld>
             <a:endParaRPr lang="en-US"/>
           </a:p>
@@ -1468,7 +1904,7 @@
           <a:p>
             <a:fld id="{5F31DA2F-80B8-49CF-99FB-5ABCA53A607A}" type="datetime1">
               <a:rPr lang="en-US" smtClean="0"/>
-              <a:t>9/12/21</a:t>
+              <a:t>9/13/21</a:t>
             </a:fld>
             <a:endParaRPr lang="en-US"/>
           </a:p>
@@ -1883,7 +2319,7 @@
           <a:p>
             <a:fld id="{28852172-E6C9-4B6C-929A-A9DE3837BBF1}" type="datetime1">
               <a:rPr lang="en-US" smtClean="0"/>
-              <a:t>9/12/21</a:t>
+              <a:t>9/13/21</a:t>
             </a:fld>
             <a:endParaRPr lang="en-US"/>
           </a:p>
@@ -2035,7 +2471,7 @@
           <a:p>
             <a:fld id="{3AB41CFF-90C9-47B3-9DA1-F2BF8D839F7E}" type="datetime1">
               <a:rPr lang="en-US" smtClean="0"/>
-              <a:t>9/12/21</a:t>
+              <a:t>9/13/21</a:t>
             </a:fld>
             <a:endParaRPr lang="en-US"/>
           </a:p>
@@ -2148,7 +2584,7 @@
           <a:p>
             <a:fld id="{F06048FA-06AB-4884-A69B-986B96E68A24}" type="datetime1">
               <a:rPr lang="en-US" smtClean="0"/>
-              <a:t>9/12/21</a:t>
+              <a:t>9/13/21</a:t>
             </a:fld>
             <a:endParaRPr lang="en-US"/>
           </a:p>
@@ -2459,7 +2895,7 @@
           <a:p>
             <a:fld id="{50DB7ABA-0172-4F9C-889D-567164F66BCD}" type="datetime1">
               <a:rPr lang="en-US" smtClean="0"/>
-              <a:t>9/12/21</a:t>
+              <a:t>9/13/21</a:t>
             </a:fld>
             <a:endParaRPr lang="en-US"/>
           </a:p>
@@ -2750,7 +3186,7 @@
           <a:p>
             <a:fld id="{78AC6A5B-8AE7-4A41-B5A7-9ADC6686DC18}" type="datetime1">
               <a:rPr lang="en-US" smtClean="0"/>
-              <a:t>9/12/21</a:t>
+              <a:t>9/13/21</a:t>
             </a:fld>
             <a:endParaRPr lang="en-US"/>
           </a:p>
@@ -3089,7 +3525,7 @@
             <a:fld id="{57E0CF6C-748E-4B7A-BC8B-3011EF78ED13}" type="datetime1">
               <a:rPr lang="en-US" smtClean="0"/>
               <a:pPr/>
-              <a:t>9/12/21</a:t>
+              <a:t>9/13/21</a:t>
             </a:fld>
             <a:endParaRPr lang="en-US" dirty="0"/>
           </a:p>
@@ -4605,7 +5041,7 @@
     <p:bg>
       <p:bgPr>
         <a:blipFill>
-          <a:blip r:embed="rId2"/>
+          <a:blip r:embed="rId3"/>
           <a:tile tx="0" ty="0" sx="100000" sy="100000" flip="none" algn="tl"/>
         </a:blipFill>
         <a:effectLst/>
@@ -4822,7 +5258,7 @@
             </p:nvPr>
           </p:nvPicPr>
           <p:blipFill rotWithShape="1">
-            <a:blip r:embed="rId3">
+            <a:blip r:embed="rId4">
               <a:duotone>
                 <a:schemeClr val="accent6">
                   <a:shade val="45000"/>
@@ -4874,7 +5310,7 @@
             </p:nvPr>
           </p:nvPicPr>
           <p:blipFill rotWithShape="1">
-            <a:blip r:embed="rId3">
+            <a:blip r:embed="rId4">
               <a:duotone>
                 <a:schemeClr val="accent6">
                   <a:shade val="45000"/>
@@ -4968,27 +5404,18 @@
           <a:p>
             <a:r>
               <a:rPr lang="en-AU" sz="1800" dirty="0">
-                <a:hlinkClick r:id="rId4"/>
+                <a:hlinkClick r:id="rId5"/>
               </a:rPr>
               <a:t>https://www.kaggle.com/kumarajarshi/life-expectancy-who</a:t>
             </a:r>
             <a:endParaRPr lang="en-AU" sz="1800" dirty="0"/>
-          </a:p>
-          <a:p>
-            <a:r>
-              <a:rPr lang="en-US" sz="1800" dirty="0">
-                <a:hlinkClick r:id="rId5"/>
-              </a:rPr>
-              <a:t>https://www.kaggle.com/andradaolteanu/country-mapping-iso-continent-region</a:t>
-            </a:r>
-            <a:endParaRPr lang="en-US" sz="1800" dirty="0"/>
           </a:p>
           <a:p>
             <a:r>
               <a:rPr lang="en-US" sz="1800" dirty="0">
                 <a:hlinkClick r:id="rId6"/>
               </a:rPr>
-              <a:t>https://plotly.com/javascript/gapminder-example/</a:t>
+              <a:t>https://www.kaggle.com/andradaolteanu/country-mapping-iso-continent-region</a:t>
             </a:r>
             <a:endParaRPr lang="en-US" sz="1800" dirty="0"/>
           </a:p>
@@ -4997,7 +5424,7 @@
               <a:rPr lang="en-US" sz="1800" dirty="0">
                 <a:hlinkClick r:id="rId7"/>
               </a:rPr>
-              <a:t>https://leafletjs.com/examples/choropleth/</a:t>
+              <a:t>https://plotly.com/javascript/gapminder-example/</a:t>
             </a:r>
             <a:endParaRPr lang="en-US" sz="1800" dirty="0"/>
           </a:p>
@@ -5005,6 +5432,15 @@
             <a:r>
               <a:rPr lang="en-US" sz="1800" dirty="0">
                 <a:hlinkClick r:id="rId8"/>
+              </a:rPr>
+              <a:t>https://plotly.com/javascript/choropleth-maps/</a:t>
+            </a:r>
+            <a:endParaRPr lang="en-US" sz="1800" dirty="0"/>
+          </a:p>
+          <a:p>
+            <a:r>
+              <a:rPr lang="en-US" sz="1800" dirty="0">
+                <a:hlinkClick r:id="rId9"/>
               </a:rPr>
               <a:t>https://plotly.com/javascript/box-plots/</a:t>
             </a:r>
@@ -6341,4 +6777,299 @@
     </a:ext>
   </a:extLst>
 </a:theme>
+</file>
+
+<file path=ppt/theme/theme2.xml><?xml version="1.0" encoding="utf-8"?>
+<a:theme xmlns:a="http://schemas.openxmlformats.org/drawingml/2006/main" name="Office Theme">
+  <a:themeElements>
+    <a:clrScheme name="Office">
+      <a:dk1>
+        <a:sysClr val="windowText" lastClr="000000"/>
+      </a:dk1>
+      <a:lt1>
+        <a:sysClr val="window" lastClr="FFFFFF"/>
+      </a:lt1>
+      <a:dk2>
+        <a:srgbClr val="44546A"/>
+      </a:dk2>
+      <a:lt2>
+        <a:srgbClr val="E7E6E6"/>
+      </a:lt2>
+      <a:accent1>
+        <a:srgbClr val="4472C4"/>
+      </a:accent1>
+      <a:accent2>
+        <a:srgbClr val="ED7D31"/>
+      </a:accent2>
+      <a:accent3>
+        <a:srgbClr val="A5A5A5"/>
+      </a:accent3>
+      <a:accent4>
+        <a:srgbClr val="FFC000"/>
+      </a:accent4>
+      <a:accent5>
+        <a:srgbClr val="5B9BD5"/>
+      </a:accent5>
+      <a:accent6>
+        <a:srgbClr val="70AD47"/>
+      </a:accent6>
+      <a:hlink>
+        <a:srgbClr val="0563C1"/>
+      </a:hlink>
+      <a:folHlink>
+        <a:srgbClr val="954F72"/>
+      </a:folHlink>
+    </a:clrScheme>
+    <a:fontScheme name="Office">
+      <a:majorFont>
+        <a:latin typeface="Calibri Light" panose="020F0302020204030204"/>
+        <a:ea typeface=""/>
+        <a:cs typeface=""/>
+        <a:font script="Jpan" typeface="游ゴシック Light"/>
+        <a:font script="Hang" typeface="맑은 고딕"/>
+        <a:font script="Hans" typeface="等线 Light"/>
+        <a:font script="Hant" typeface="新細明體"/>
+        <a:font script="Arab" typeface="Times New Roman"/>
+        <a:font script="Hebr" typeface="Times New Roman"/>
+        <a:font script="Thai" typeface="Angsana New"/>
+        <a:font script="Ethi" typeface="Nyala"/>
+        <a:font script="Beng" typeface="Vrinda"/>
+        <a:font script="Gujr" typeface="Shruti"/>
+        <a:font script="Khmr" typeface="MoolBoran"/>
+        <a:font script="Knda" typeface="Tunga"/>
+        <a:font script="Guru" typeface="Raavi"/>
+        <a:font script="Cans" typeface="Euphemia"/>
+        <a:font script="Cher" typeface="Plantagenet Cherokee"/>
+        <a:font script="Yiii" typeface="Microsoft Yi Baiti"/>
+        <a:font script="Tibt" typeface="Microsoft Himalaya"/>
+        <a:font script="Thaa" typeface="MV Boli"/>
+        <a:font script="Deva" typeface="Mangal"/>
+        <a:font script="Telu" typeface="Gautami"/>
+        <a:font script="Taml" typeface="Latha"/>
+        <a:font script="Syrc" typeface="Estrangelo Edessa"/>
+        <a:font script="Orya" typeface="Kalinga"/>
+        <a:font script="Mlym" typeface="Kartika"/>
+        <a:font script="Laoo" typeface="DokChampa"/>
+        <a:font script="Sinh" typeface="Iskoola Pota"/>
+        <a:font script="Mong" typeface="Mongolian Baiti"/>
+        <a:font script="Viet" typeface="Times New Roman"/>
+        <a:font script="Uigh" typeface="Microsoft Uighur"/>
+        <a:font script="Geor" typeface="Sylfaen"/>
+        <a:font script="Armn" typeface="Arial"/>
+        <a:font script="Bugi" typeface="Leelawadee UI"/>
+        <a:font script="Bopo" typeface="Microsoft JhengHei"/>
+        <a:font script="Java" typeface="Javanese Text"/>
+        <a:font script="Lisu" typeface="Segoe UI"/>
+        <a:font script="Mymr" typeface="Myanmar Text"/>
+        <a:font script="Nkoo" typeface="Ebrima"/>
+        <a:font script="Olck" typeface="Nirmala UI"/>
+        <a:font script="Osma" typeface="Ebrima"/>
+        <a:font script="Phag" typeface="Phagspa"/>
+        <a:font script="Syrn" typeface="Estrangelo Edessa"/>
+        <a:font script="Syrj" typeface="Estrangelo Edessa"/>
+        <a:font script="Syre" typeface="Estrangelo Edessa"/>
+        <a:font script="Sora" typeface="Nirmala UI"/>
+        <a:font script="Tale" typeface="Microsoft Tai Le"/>
+        <a:font script="Talu" typeface="Microsoft New Tai Lue"/>
+        <a:font script="Tfng" typeface="Ebrima"/>
+      </a:majorFont>
+      <a:minorFont>
+        <a:latin typeface="Calibri" panose="020F0502020204030204"/>
+        <a:ea typeface=""/>
+        <a:cs typeface=""/>
+        <a:font script="Jpan" typeface="游ゴシック"/>
+        <a:font script="Hang" typeface="맑은 고딕"/>
+        <a:font script="Hans" typeface="等线"/>
+        <a:font script="Hant" typeface="新細明體"/>
+        <a:font script="Arab" typeface="Arial"/>
+        <a:font script="Hebr" typeface="Arial"/>
+        <a:font script="Thai" typeface="Cordia New"/>
+        <a:font script="Ethi" typeface="Nyala"/>
+        <a:font script="Beng" typeface="Vrinda"/>
+        <a:font script="Gujr" typeface="Shruti"/>
+        <a:font script="Khmr" typeface="DaunPenh"/>
+        <a:font script="Knda" typeface="Tunga"/>
+        <a:font script="Guru" typeface="Raavi"/>
+        <a:font script="Cans" typeface="Euphemia"/>
+        <a:font script="Cher" typeface="Plantagenet Cherokee"/>
+        <a:font script="Yiii" typeface="Microsoft Yi Baiti"/>
+        <a:font script="Tibt" typeface="Microsoft Himalaya"/>
+        <a:font script="Thaa" typeface="MV Boli"/>
+        <a:font script="Deva" typeface="Mangal"/>
+        <a:font script="Telu" typeface="Gautami"/>
+        <a:font script="Taml" typeface="Latha"/>
+        <a:font script="Syrc" typeface="Estrangelo Edessa"/>
+        <a:font script="Orya" typeface="Kalinga"/>
+        <a:font script="Mlym" typeface="Kartika"/>
+        <a:font script="Laoo" typeface="DokChampa"/>
+        <a:font script="Sinh" typeface="Iskoola Pota"/>
+        <a:font script="Mong" typeface="Mongolian Baiti"/>
+        <a:font script="Viet" typeface="Arial"/>
+        <a:font script="Uigh" typeface="Microsoft Uighur"/>
+        <a:font script="Geor" typeface="Sylfaen"/>
+        <a:font script="Armn" typeface="Arial"/>
+        <a:font script="Bugi" typeface="Leelawadee UI"/>
+        <a:font script="Bopo" typeface="Microsoft JhengHei"/>
+        <a:font script="Java" typeface="Javanese Text"/>
+        <a:font script="Lisu" typeface="Segoe UI"/>
+        <a:font script="Mymr" typeface="Myanmar Text"/>
+        <a:font script="Nkoo" typeface="Ebrima"/>
+        <a:font script="Olck" typeface="Nirmala UI"/>
+        <a:font script="Osma" typeface="Ebrima"/>
+        <a:font script="Phag" typeface="Phagspa"/>
+        <a:font script="Syrn" typeface="Estrangelo Edessa"/>
+        <a:font script="Syrj" typeface="Estrangelo Edessa"/>
+        <a:font script="Syre" typeface="Estrangelo Edessa"/>
+        <a:font script="Sora" typeface="Nirmala UI"/>
+        <a:font script="Tale" typeface="Microsoft Tai Le"/>
+        <a:font script="Talu" typeface="Microsoft New Tai Lue"/>
+        <a:font script="Tfng" typeface="Ebrima"/>
+      </a:minorFont>
+    </a:fontScheme>
+    <a:fmtScheme name="Office">
+      <a:fillStyleLst>
+        <a:solidFill>
+          <a:schemeClr val="phClr"/>
+        </a:solidFill>
+        <a:gradFill rotWithShape="1">
+          <a:gsLst>
+            <a:gs pos="0">
+              <a:schemeClr val="phClr">
+                <a:lumMod val="110000"/>
+                <a:satMod val="105000"/>
+                <a:tint val="67000"/>
+              </a:schemeClr>
+            </a:gs>
+            <a:gs pos="50000">
+              <a:schemeClr val="phClr">
+                <a:lumMod val="105000"/>
+                <a:satMod val="103000"/>
+                <a:tint val="73000"/>
+              </a:schemeClr>
+            </a:gs>
+            <a:gs pos="100000">
+              <a:schemeClr val="phClr">
+                <a:lumMod val="105000"/>
+                <a:satMod val="109000"/>
+                <a:tint val="81000"/>
+              </a:schemeClr>
+            </a:gs>
+          </a:gsLst>
+          <a:lin ang="5400000" scaled="0"/>
+        </a:gradFill>
+        <a:gradFill rotWithShape="1">
+          <a:gsLst>
+            <a:gs pos="0">
+              <a:schemeClr val="phClr">
+                <a:satMod val="103000"/>
+                <a:lumMod val="102000"/>
+                <a:tint val="94000"/>
+              </a:schemeClr>
+            </a:gs>
+            <a:gs pos="50000">
+              <a:schemeClr val="phClr">
+                <a:satMod val="110000"/>
+                <a:lumMod val="100000"/>
+                <a:shade val="100000"/>
+              </a:schemeClr>
+            </a:gs>
+            <a:gs pos="100000">
+              <a:schemeClr val="phClr">
+                <a:lumMod val="99000"/>
+                <a:satMod val="120000"/>
+                <a:shade val="78000"/>
+              </a:schemeClr>
+            </a:gs>
+          </a:gsLst>
+          <a:lin ang="5400000" scaled="0"/>
+        </a:gradFill>
+      </a:fillStyleLst>
+      <a:lnStyleLst>
+        <a:ln w="6350" cap="flat" cmpd="sng" algn="ctr">
+          <a:solidFill>
+            <a:schemeClr val="phClr"/>
+          </a:solidFill>
+          <a:prstDash val="solid"/>
+          <a:miter lim="800000"/>
+        </a:ln>
+        <a:ln w="12700" cap="flat" cmpd="sng" algn="ctr">
+          <a:solidFill>
+            <a:schemeClr val="phClr"/>
+          </a:solidFill>
+          <a:prstDash val="solid"/>
+          <a:miter lim="800000"/>
+        </a:ln>
+        <a:ln w="19050" cap="flat" cmpd="sng" algn="ctr">
+          <a:solidFill>
+            <a:schemeClr val="phClr"/>
+          </a:solidFill>
+          <a:prstDash val="solid"/>
+          <a:miter lim="800000"/>
+        </a:ln>
+      </a:lnStyleLst>
+      <a:effectStyleLst>
+        <a:effectStyle>
+          <a:effectLst/>
+        </a:effectStyle>
+        <a:effectStyle>
+          <a:effectLst/>
+        </a:effectStyle>
+        <a:effectStyle>
+          <a:effectLst>
+            <a:outerShdw blurRad="57150" dist="19050" dir="5400000" algn="ctr" rotWithShape="0">
+              <a:srgbClr val="000000">
+                <a:alpha val="63000"/>
+              </a:srgbClr>
+            </a:outerShdw>
+          </a:effectLst>
+        </a:effectStyle>
+      </a:effectStyleLst>
+      <a:bgFillStyleLst>
+        <a:solidFill>
+          <a:schemeClr val="phClr"/>
+        </a:solidFill>
+        <a:solidFill>
+          <a:schemeClr val="phClr">
+            <a:tint val="95000"/>
+            <a:satMod val="170000"/>
+          </a:schemeClr>
+        </a:solidFill>
+        <a:gradFill rotWithShape="1">
+          <a:gsLst>
+            <a:gs pos="0">
+              <a:schemeClr val="phClr">
+                <a:tint val="93000"/>
+                <a:satMod val="150000"/>
+                <a:shade val="98000"/>
+                <a:lumMod val="102000"/>
+              </a:schemeClr>
+            </a:gs>
+            <a:gs pos="50000">
+              <a:schemeClr val="phClr">
+                <a:tint val="98000"/>
+                <a:satMod val="130000"/>
+                <a:shade val="90000"/>
+                <a:lumMod val="103000"/>
+              </a:schemeClr>
+            </a:gs>
+            <a:gs pos="100000">
+              <a:schemeClr val="phClr">
+                <a:shade val="63000"/>
+                <a:satMod val="120000"/>
+              </a:schemeClr>
+            </a:gs>
+          </a:gsLst>
+          <a:lin ang="5400000" scaled="0"/>
+        </a:gradFill>
+      </a:bgFillStyleLst>
+    </a:fmtScheme>
+  </a:themeElements>
+  <a:objectDefaults/>
+  <a:extraClrSchemeLst/>
+  <a:extLst>
+    <a:ext uri="{05A4C25C-085E-4340-85A3-A5531E510DB2}">
+      <thm15:themeFamily xmlns:thm15="http://schemas.microsoft.com/office/thememl/2012/main" name="Office Theme" id="{62F939B6-93AF-4DB8-9C6B-D6C7DFDC589F}" vid="{4A3C46E8-61CC-4603-A589-7422A47A8E4A}"/>
+    </a:ext>
+  </a:extLst>
+</a:theme>
 </file>
</xml_diff>